<commit_message>
first of session 4
</commit_message>
<xml_diff>
--- a/JS_React_Training.pptx
+++ b/JS_React_Training.pptx
@@ -5,7 +5,7 @@
     <p:sldMasterId id="2147483648" r:id="rId1"/>
   </p:sldMasterIdLst>
   <p:notesMasterIdLst>
-    <p:notesMasterId r:id="rId75"/>
+    <p:notesMasterId r:id="rId80"/>
   </p:notesMasterIdLst>
   <p:sldIdLst>
     <p:sldId id="256" r:id="rId2"/>
@@ -78,9 +78,14 @@
     <p:sldId id="350" r:id="rId69"/>
     <p:sldId id="355" r:id="rId70"/>
     <p:sldId id="373" r:id="rId71"/>
-    <p:sldId id="356" r:id="rId72"/>
-    <p:sldId id="357" r:id="rId73"/>
-    <p:sldId id="358" r:id="rId74"/>
+    <p:sldId id="374" r:id="rId72"/>
+    <p:sldId id="356" r:id="rId73"/>
+    <p:sldId id="375" r:id="rId74"/>
+    <p:sldId id="378" r:id="rId75"/>
+    <p:sldId id="357" r:id="rId76"/>
+    <p:sldId id="358" r:id="rId77"/>
+    <p:sldId id="377" r:id="rId78"/>
+    <p:sldId id="376" r:id="rId79"/>
   </p:sldIdLst>
   <p:sldSz cx="12192000" cy="6858000"/>
   <p:notesSz cx="6858000" cy="9144000"/>
@@ -249,10 +254,6 @@
             <p14:sldId id="338"/>
             <p14:sldId id="339"/>
             <p14:sldId id="344"/>
-          </p14:sldIdLst>
-        </p14:section>
-        <p14:section name="session4" id="{CB7C94F2-80E3-43BC-9201-B453DEB327D6}">
-          <p14:sldIdLst>
             <p14:sldId id="351"/>
             <p14:sldId id="346"/>
             <p14:sldId id="340"/>
@@ -265,10 +266,19 @@
             <p14:sldId id="354"/>
             <p14:sldId id="350"/>
             <p14:sldId id="355"/>
+          </p14:sldIdLst>
+        </p14:section>
+        <p14:section name="session4" id="{CB7C94F2-80E3-43BC-9201-B453DEB327D6}">
+          <p14:sldIdLst>
             <p14:sldId id="373"/>
+            <p14:sldId id="374"/>
             <p14:sldId id="356"/>
+            <p14:sldId id="375"/>
+            <p14:sldId id="378"/>
             <p14:sldId id="357"/>
             <p14:sldId id="358"/>
+            <p14:sldId id="377"/>
+            <p14:sldId id="376"/>
           </p14:sldIdLst>
         </p14:section>
       </p14:sectionLst>
@@ -374,7 +384,7 @@
           <a:p>
             <a:fld id="{47EC82D6-6E98-4B9D-9FF0-FE2786CC9204}" type="datetimeFigureOut">
               <a:rPr lang="en-US" smtClean="0"/>
-              <a:t>4/13/2021</a:t>
+              <a:t>4/20/2021</a:t>
             </a:fld>
             <a:endParaRPr lang="en-US"/>
           </a:p>
@@ -2724,7 +2734,7 @@
           <a:p>
             <a:fld id="{397E0307-B85C-446A-8EF0-0407D435D787}" type="datetimeFigureOut">
               <a:rPr lang="en-US" dirty="0"/>
-              <a:t>4/13/2021</a:t>
+              <a:t>4/20/2021</a:t>
             </a:fld>
             <a:endParaRPr lang="en-US" dirty="0"/>
           </a:p>
@@ -3133,7 +3143,7 @@
           <a:p>
             <a:fld id="{8BD862E7-95FA-4FC4-9EC5-DDBFA8DC7417}" type="datetimeFigureOut">
               <a:rPr lang="en-US" dirty="0"/>
-              <a:t>4/13/2021</a:t>
+              <a:t>4/20/2021</a:t>
             </a:fld>
             <a:endParaRPr lang="en-US" dirty="0"/>
           </a:p>
@@ -3464,7 +3474,7 @@
           <a:p>
             <a:fld id="{8DB987F2-A784-4F72-BB57-0E9EACDE722E}" type="datetimeFigureOut">
               <a:rPr lang="en-US" dirty="0"/>
-              <a:t>4/13/2021</a:t>
+              <a:t>4/20/2021</a:t>
             </a:fld>
             <a:endParaRPr lang="en-US" dirty="0"/>
           </a:p>
@@ -3864,7 +3874,7 @@
           <a:p>
             <a:fld id="{40BBD51E-4B19-444E-85C0-DBD7EB6263F4}" type="datetimeFigureOut">
               <a:rPr lang="en-US" dirty="0"/>
-              <a:t>4/13/2021</a:t>
+              <a:t>4/20/2021</a:t>
             </a:fld>
             <a:endParaRPr lang="en-US" dirty="0"/>
           </a:p>
@@ -4427,7 +4437,7 @@
           <a:p>
             <a:fld id="{F0D7255A-4AD5-4D3E-9A0A-689DA3BA976C}" type="datetimeFigureOut">
               <a:rPr lang="en-US" dirty="0"/>
-              <a:t>4/13/2021</a:t>
+              <a:t>4/20/2021</a:t>
             </a:fld>
             <a:endParaRPr lang="en-US" dirty="0"/>
           </a:p>
@@ -5103,7 +5113,7 @@
           <a:p>
             <a:fld id="{3EE0AD15-87AC-45B2-9EE5-8D165AF83CD7}" type="datetimeFigureOut">
               <a:rPr lang="en-US" dirty="0"/>
-              <a:t>4/13/2021</a:t>
+              <a:t>4/20/2021</a:t>
             </a:fld>
             <a:endParaRPr lang="en-US" dirty="0"/>
           </a:p>
@@ -6011,7 +6021,7 @@
           <a:p>
             <a:fld id="{FCC40CCD-F0D6-4CC2-A4C8-2D7D0D875F02}" type="datetimeFigureOut">
               <a:rPr lang="en-US" dirty="0"/>
-              <a:t>4/13/2021</a:t>
+              <a:t>4/20/2021</a:t>
             </a:fld>
             <a:endParaRPr lang="en-US" dirty="0"/>
           </a:p>
@@ -6319,7 +6329,7 @@
           <a:p>
             <a:fld id="{B3CFE2CC-454D-4466-AC55-B86DA0A87BAE}" type="datetimeFigureOut">
               <a:rPr lang="en-US" dirty="0"/>
-              <a:t>4/13/2021</a:t>
+              <a:t>4/20/2021</a:t>
             </a:fld>
             <a:endParaRPr lang="en-US" dirty="0"/>
           </a:p>
@@ -6578,7 +6588,7 @@
           <a:p>
             <a:fld id="{B647B1BF-4039-460D-A637-65428CBD720E}" type="datetimeFigureOut">
               <a:rPr lang="en-US" dirty="0"/>
-              <a:t>4/13/2021</a:t>
+              <a:t>4/20/2021</a:t>
             </a:fld>
             <a:endParaRPr lang="en-US" dirty="0"/>
           </a:p>
@@ -6932,7 +6942,7 @@
           <a:p>
             <a:fld id="{AAA39ACE-9343-4EBE-B5CA-AEA240A1DC53}" type="datetimeFigureOut">
               <a:rPr lang="en-US" dirty="0"/>
-              <a:t>4/13/2021</a:t>
+              <a:t>4/20/2021</a:t>
             </a:fld>
             <a:endParaRPr lang="en-US" dirty="0"/>
           </a:p>
@@ -7316,7 +7326,7 @@
           <a:p>
             <a:fld id="{C9A00F7B-89C5-4DF7-A309-6263220147D4}" type="datetimeFigureOut">
               <a:rPr lang="en-US" dirty="0"/>
-              <a:t>4/13/2021</a:t>
+              <a:t>4/20/2021</a:t>
             </a:fld>
             <a:endParaRPr lang="en-US" dirty="0"/>
           </a:p>
@@ -7687,7 +7697,7 @@
           <a:p>
             <a:fld id="{449C95DE-FD64-4606-AE61-EC1136867CC6}" type="datetimeFigureOut">
               <a:rPr lang="en-US" dirty="0"/>
-              <a:t>4/13/2021</a:t>
+              <a:t>4/20/2021</a:t>
             </a:fld>
             <a:endParaRPr lang="en-US" dirty="0"/>
           </a:p>
@@ -8188,7 +8198,7 @@
           <a:p>
             <a:fld id="{5DEB0BBD-30FE-4CF1-900A-0C45149F8AF8}" type="datetimeFigureOut">
               <a:rPr lang="en-US" dirty="0"/>
-              <a:t>4/13/2021</a:t>
+              <a:t>4/20/2021</a:t>
             </a:fld>
             <a:endParaRPr lang="en-US" dirty="0"/>
           </a:p>
@@ -8440,7 +8450,7 @@
           <a:p>
             <a:fld id="{B91A5F7F-3E81-4C65-A4D1-CB62D5B9DB91}" type="datetimeFigureOut">
               <a:rPr lang="en-US" dirty="0"/>
-              <a:t>4/13/2021</a:t>
+              <a:t>4/20/2021</a:t>
             </a:fld>
             <a:endParaRPr lang="en-US" dirty="0"/>
           </a:p>
@@ -8598,7 +8608,7 @@
           <a:p>
             <a:fld id="{377ECC86-1672-4627-AEFE-EC5485C73905}" type="datetimeFigureOut">
               <a:rPr lang="en-US" dirty="0"/>
-              <a:t>4/13/2021</a:t>
+              <a:t>4/20/2021</a:t>
             </a:fld>
             <a:endParaRPr lang="en-US" dirty="0"/>
           </a:p>
@@ -8983,7 +8993,7 @@
           <a:p>
             <a:fld id="{3CDCB01F-D966-4C62-B900-0BE008A90C98}" type="datetimeFigureOut">
               <a:rPr lang="en-US" dirty="0"/>
-              <a:t>4/13/2021</a:t>
+              <a:t>4/20/2021</a:t>
             </a:fld>
             <a:endParaRPr lang="en-US" dirty="0"/>
           </a:p>
@@ -9387,7 +9397,7 @@
           <a:p>
             <a:fld id="{5E73A0EA-7DC7-4964-BB97-B173EF3B859A}" type="datetimeFigureOut">
               <a:rPr lang="en-US" dirty="0"/>
-              <a:t>4/13/2021</a:t>
+              <a:t>4/20/2021</a:t>
             </a:fld>
             <a:endParaRPr lang="en-US" dirty="0"/>
           </a:p>
@@ -9626,7 +9636,7 @@
           <a:p>
             <a:fld id="{30EF52CC-F3D9-41D4-BCE4-C208E61A3F31}" type="datetimeFigureOut">
               <a:rPr lang="en-US" dirty="0"/>
-              <a:t>4/13/2021</a:t>
+              <a:t>4/20/2021</a:t>
             </a:fld>
             <a:endParaRPr lang="en-US" dirty="0"/>
           </a:p>
@@ -13758,11 +13768,7 @@
           <a:p>
             <a:r>
               <a:rPr lang="en-US" dirty="0" smtClean="0"/>
-              <a:t>Modern </a:t>
-            </a:r>
-            <a:r>
-              <a:rPr lang="en-US" dirty="0" smtClean="0"/>
-              <a:t>JavaScript (ES6-2015)</a:t>
+              <a:t>Modern JavaScript (ES6-2015)</a:t>
             </a:r>
             <a:endParaRPr lang="en-US" dirty="0"/>
           </a:p>
@@ -17852,7 +17858,7 @@
             </a:r>
             <a:r>
               <a:rPr lang="en-US" dirty="0" smtClean="0"/>
-              <a:t> I </a:t>
+              <a:t> install -g</a:t>
             </a:r>
           </a:p>
           <a:p>
@@ -18495,8 +18501,22 @@
           <a:p>
             <a:r>
               <a:rPr lang="en-US" dirty="0" smtClean="0"/>
-              <a:t>props</a:t>
-            </a:r>
+              <a:t>Props</a:t>
+            </a:r>
+          </a:p>
+          <a:p>
+            <a:r>
+              <a:rPr lang="en-US" dirty="0" smtClean="0"/>
+              <a:t>Children</a:t>
+            </a:r>
+          </a:p>
+          <a:p>
+            <a:r>
+              <a:rPr lang="en-US" dirty="0"/>
+              <a:t>List &amp; keys</a:t>
+            </a:r>
+          </a:p>
+          <a:p>
             <a:endParaRPr lang="en-US" dirty="0"/>
           </a:p>
         </p:txBody>
@@ -18548,7 +18568,7 @@
           <a:p>
             <a:r>
               <a:rPr lang="en-US" dirty="0" smtClean="0"/>
-              <a:t>State in class components</a:t>
+              <a:t>Component</a:t>
             </a:r>
             <a:endParaRPr lang="en-US" dirty="0"/>
           </a:p>
@@ -18575,53 +18595,13 @@
             </a:r>
           </a:p>
           <a:p>
-            <a:pPr lvl="1"/>
-            <a:r>
-              <a:rPr lang="en-US" dirty="0" smtClean="0"/>
-              <a:t>Mounting</a:t>
-            </a:r>
-          </a:p>
-          <a:p>
-            <a:pPr lvl="1"/>
-            <a:r>
-              <a:rPr lang="en-US" dirty="0" smtClean="0"/>
-              <a:t>Updating</a:t>
-            </a:r>
-          </a:p>
-          <a:p>
-            <a:pPr lvl="1"/>
-            <a:r>
-              <a:rPr lang="en-US" dirty="0" smtClean="0"/>
-              <a:t>Unmounting</a:t>
-            </a:r>
-          </a:p>
-          <a:p>
-            <a:r>
-              <a:rPr lang="en-US" dirty="0" err="1" smtClean="0"/>
-              <a:t>setState</a:t>
-            </a:r>
-            <a:r>
-              <a:rPr lang="en-US" dirty="0" smtClean="0"/>
-              <a:t>()</a:t>
-            </a:r>
-          </a:p>
-          <a:p>
-            <a:r>
-              <a:rPr lang="en-US" dirty="0" smtClean="0"/>
-              <a:t>Asynchronous</a:t>
-            </a:r>
-          </a:p>
-          <a:p>
-            <a:r>
-              <a:rPr lang="en-US" dirty="0" smtClean="0"/>
-              <a:t>Merge</a:t>
-            </a:r>
-          </a:p>
-          <a:p>
-            <a:r>
-              <a:rPr lang="en-US" dirty="0" smtClean="0"/>
-              <a:t>The data flows down</a:t>
-            </a:r>
+            <a:r>
+              <a:rPr lang="en-US" dirty="0" smtClean="0"/>
+              <a:t>Hook</a:t>
+            </a:r>
+            <a:endParaRPr lang="en-US" dirty="0" smtClean="0"/>
+          </a:p>
+          <a:p>
             <a:endParaRPr lang="en-US" dirty="0"/>
           </a:p>
         </p:txBody>
@@ -18629,7 +18609,7 @@
     </p:spTree>
     <p:extLst>
       <p:ext uri="{BB962C8B-B14F-4D97-AF65-F5344CB8AC3E}">
-        <p14:creationId xmlns:p14="http://schemas.microsoft.com/office/powerpoint/2010/main" val="2987371282"/>
+        <p14:creationId xmlns:p14="http://schemas.microsoft.com/office/powerpoint/2010/main" val="2591699096"/>
       </p:ext>
     </p:extLst>
   </p:cSld>
@@ -18673,7 +18653,7 @@
           <a:p>
             <a:r>
               <a:rPr lang="en-US" dirty="0" smtClean="0"/>
-              <a:t>Events</a:t>
+              <a:t>State in class components</a:t>
             </a:r>
             <a:endParaRPr lang="en-US" dirty="0"/>
           </a:p>
@@ -18696,62 +18676,57 @@
           <a:p>
             <a:r>
               <a:rPr lang="en-US" dirty="0" smtClean="0"/>
-              <a:t>Pass references instead of string in </a:t>
-            </a:r>
+              <a:t>Lifecycle methods</a:t>
+            </a:r>
+          </a:p>
+          <a:p>
+            <a:pPr lvl="1"/>
+            <a:r>
+              <a:rPr lang="en-US" dirty="0" smtClean="0"/>
+              <a:t>Mounting</a:t>
+            </a:r>
+          </a:p>
+          <a:p>
+            <a:pPr lvl="1"/>
+            <a:r>
+              <a:rPr lang="en-US" dirty="0" smtClean="0"/>
+              <a:t>Updating</a:t>
+            </a:r>
+          </a:p>
+          <a:p>
+            <a:pPr lvl="1"/>
+            <a:r>
+              <a:rPr lang="en-US" dirty="0" smtClean="0"/>
+              <a:t>Unmounting</a:t>
+            </a:r>
+          </a:p>
+          <a:p>
             <a:r>
               <a:rPr lang="en-US" dirty="0" err="1" smtClean="0"/>
-              <a:t>attrebuite</a:t>
-            </a:r>
-            <a:endParaRPr lang="en-US" dirty="0" smtClean="0"/>
-          </a:p>
-          <a:p>
-            <a:r>
-              <a:rPr lang="en-US" dirty="0" err="1" smtClean="0"/>
-              <a:t>e.preventDefault</a:t>
-            </a:r>
-            <a:r>
-              <a:rPr lang="en-US" dirty="0" smtClean="0"/>
-              <a:t>();</a:t>
-            </a:r>
-          </a:p>
-          <a:p>
-            <a:r>
-              <a:rPr lang="en-US" dirty="0" smtClean="0"/>
-              <a:t>bind to this / arrow functions</a:t>
-            </a:r>
-          </a:p>
-          <a:p>
-            <a:r>
-              <a:rPr lang="en-US" dirty="0" smtClean="0"/>
-              <a:t>Passing arguments to event handler</a:t>
-            </a:r>
-          </a:p>
-          <a:p>
-            <a:pPr lvl="1"/>
-            <a:r>
-              <a:rPr lang="en-US" dirty="0"/>
-              <a:t>a</a:t>
-            </a:r>
-            <a:r>
-              <a:rPr lang="en-US" dirty="0" smtClean="0"/>
-              <a:t>rrow function</a:t>
-            </a:r>
-          </a:p>
-          <a:p>
-            <a:pPr lvl="1"/>
-            <a:r>
-              <a:rPr lang="en-US" dirty="0" smtClean="0"/>
-              <a:t>bind</a:t>
-            </a:r>
-          </a:p>
-          <a:p>
-            <a:endParaRPr lang="en-US" dirty="0" smtClean="0"/>
-          </a:p>
-          <a:p>
-            <a:pPr lvl="1"/>
-            <a:endParaRPr lang="en-US" dirty="0" smtClean="0"/>
-          </a:p>
-          <a:p>
+              <a:t>setState</a:t>
+            </a:r>
+            <a:r>
+              <a:rPr lang="en-US" dirty="0" smtClean="0"/>
+              <a:t>()</a:t>
+            </a:r>
+          </a:p>
+          <a:p>
+            <a:r>
+              <a:rPr lang="en-US" dirty="0" smtClean="0"/>
+              <a:t>Asynchronous</a:t>
+            </a:r>
+          </a:p>
+          <a:p>
+            <a:r>
+              <a:rPr lang="en-US" dirty="0" smtClean="0"/>
+              <a:t>Merge</a:t>
+            </a:r>
+          </a:p>
+          <a:p>
+            <a:r>
+              <a:rPr lang="en-US" dirty="0" smtClean="0"/>
+              <a:t>The data flows down</a:t>
+            </a:r>
             <a:endParaRPr lang="en-US" dirty="0"/>
           </a:p>
         </p:txBody>
@@ -18759,7 +18734,7 @@
     </p:spTree>
     <p:extLst>
       <p:ext uri="{BB962C8B-B14F-4D97-AF65-F5344CB8AC3E}">
-        <p14:creationId xmlns:p14="http://schemas.microsoft.com/office/powerpoint/2010/main" val="2840278042"/>
+        <p14:creationId xmlns:p14="http://schemas.microsoft.com/office/powerpoint/2010/main" val="2987371282"/>
       </p:ext>
     </p:extLst>
   </p:cSld>
@@ -18803,6 +18778,331 @@
           <a:p>
             <a:r>
               <a:rPr lang="en-US" dirty="0" smtClean="0"/>
+              <a:t>Styling </a:t>
+            </a:r>
+            <a:r>
+              <a:rPr lang="en-US" dirty="0" smtClean="0"/>
+              <a:t>components</a:t>
+            </a:r>
+            <a:endParaRPr lang="en-US" dirty="0"/>
+          </a:p>
+        </p:txBody>
+      </p:sp>
+      <p:sp>
+        <p:nvSpPr>
+          <p:cNvPr id="3" name="Content Placeholder 2"/>
+          <p:cNvSpPr>
+            <a:spLocks noGrp="1"/>
+          </p:cNvSpPr>
+          <p:nvPr>
+            <p:ph idx="1"/>
+          </p:nvPr>
+        </p:nvSpPr>
+        <p:spPr/>
+        <p:txBody>
+          <a:bodyPr/>
+          <a:lstStyle/>
+          <a:p>
+            <a:r>
+              <a:rPr lang="en-US" dirty="0" err="1" smtClean="0"/>
+              <a:t>Css</a:t>
+            </a:r>
+            <a:endParaRPr lang="en-US" dirty="0" smtClean="0"/>
+          </a:p>
+          <a:p>
+            <a:r>
+              <a:rPr lang="en-US" dirty="0" smtClean="0"/>
+              <a:t>Inline style</a:t>
+            </a:r>
+          </a:p>
+          <a:p>
+            <a:r>
+              <a:rPr lang="en-US" dirty="0" err="1" smtClean="0"/>
+              <a:t>Css</a:t>
+            </a:r>
+            <a:r>
+              <a:rPr lang="en-US" dirty="0" smtClean="0"/>
+              <a:t> module</a:t>
+            </a:r>
+          </a:p>
+          <a:p>
+            <a:r>
+              <a:rPr lang="en-US" dirty="0" smtClean="0"/>
+              <a:t>Other libraries</a:t>
+            </a:r>
+            <a:endParaRPr lang="en-US" dirty="0"/>
+          </a:p>
+        </p:txBody>
+      </p:sp>
+    </p:spTree>
+    <p:extLst>
+      <p:ext uri="{BB962C8B-B14F-4D97-AF65-F5344CB8AC3E}">
+        <p14:creationId xmlns:p14="http://schemas.microsoft.com/office/powerpoint/2010/main" val="3116555786"/>
+      </p:ext>
+    </p:extLst>
+  </p:cSld>
+  <p:clrMapOvr>
+    <a:masterClrMapping/>
+  </p:clrMapOvr>
+</p:sld>
+</file>
+
+<file path=ppt/slides/slide74.xml><?xml version="1.0" encoding="utf-8"?>
+<p:sld xmlns:a="http://schemas.openxmlformats.org/drawingml/2006/main" xmlns:r="http://schemas.openxmlformats.org/officeDocument/2006/relationships" xmlns:p="http://schemas.openxmlformats.org/presentationml/2006/main">
+  <p:cSld>
+    <p:spTree>
+      <p:nvGrpSpPr>
+        <p:cNvPr id="1" name=""/>
+        <p:cNvGrpSpPr/>
+        <p:nvPr/>
+      </p:nvGrpSpPr>
+      <p:grpSpPr>
+        <a:xfrm>
+          <a:off x="0" y="0"/>
+          <a:ext cx="0" cy="0"/>
+          <a:chOff x="0" y="0"/>
+          <a:chExt cx="0" cy="0"/>
+        </a:xfrm>
+      </p:grpSpPr>
+      <p:sp>
+        <p:nvSpPr>
+          <p:cNvPr id="2" name="Title 1"/>
+          <p:cNvSpPr>
+            <a:spLocks noGrp="1"/>
+          </p:cNvSpPr>
+          <p:nvPr>
+            <p:ph type="title"/>
+          </p:nvPr>
+        </p:nvSpPr>
+        <p:spPr/>
+        <p:txBody>
+          <a:bodyPr/>
+          <a:lstStyle/>
+          <a:p>
+            <a:r>
+              <a:rPr lang="en-US" dirty="0" smtClean="0"/>
+              <a:t>Starting New Project</a:t>
+            </a:r>
+            <a:endParaRPr lang="en-US" dirty="0"/>
+          </a:p>
+        </p:txBody>
+      </p:sp>
+      <p:sp>
+        <p:nvSpPr>
+          <p:cNvPr id="3" name="Content Placeholder 2"/>
+          <p:cNvSpPr>
+            <a:spLocks noGrp="1"/>
+          </p:cNvSpPr>
+          <p:nvPr>
+            <p:ph idx="1"/>
+          </p:nvPr>
+        </p:nvSpPr>
+        <p:spPr/>
+        <p:txBody>
+          <a:bodyPr/>
+          <a:lstStyle/>
+          <a:p>
+            <a:r>
+              <a:rPr lang="en-US" dirty="0" smtClean="0"/>
+              <a:t>create-react-app</a:t>
+            </a:r>
+          </a:p>
+          <a:p>
+            <a:r>
+              <a:rPr lang="en-US" dirty="0" err="1" smtClean="0"/>
+              <a:t>BurgerBuilder</a:t>
+            </a:r>
+            <a:r>
+              <a:rPr lang="en-US" dirty="0" smtClean="0"/>
+              <a:t> Project</a:t>
+            </a:r>
+          </a:p>
+          <a:p>
+            <a:r>
+              <a:rPr lang="en-US" smtClean="0"/>
+              <a:t>Structure</a:t>
+            </a:r>
+            <a:endParaRPr lang="en-US" dirty="0"/>
+          </a:p>
+        </p:txBody>
+      </p:sp>
+    </p:spTree>
+    <p:extLst>
+      <p:ext uri="{BB962C8B-B14F-4D97-AF65-F5344CB8AC3E}">
+        <p14:creationId xmlns:p14="http://schemas.microsoft.com/office/powerpoint/2010/main" val="4223007369"/>
+      </p:ext>
+    </p:extLst>
+  </p:cSld>
+  <p:clrMapOvr>
+    <a:masterClrMapping/>
+  </p:clrMapOvr>
+</p:sld>
+</file>
+
+<file path=ppt/slides/slide75.xml><?xml version="1.0" encoding="utf-8"?>
+<p:sld xmlns:a="http://schemas.openxmlformats.org/drawingml/2006/main" xmlns:r="http://schemas.openxmlformats.org/officeDocument/2006/relationships" xmlns:p="http://schemas.openxmlformats.org/presentationml/2006/main">
+  <p:cSld>
+    <p:spTree>
+      <p:nvGrpSpPr>
+        <p:cNvPr id="1" name=""/>
+        <p:cNvGrpSpPr/>
+        <p:nvPr/>
+      </p:nvGrpSpPr>
+      <p:grpSpPr>
+        <a:xfrm>
+          <a:off x="0" y="0"/>
+          <a:ext cx="0" cy="0"/>
+          <a:chOff x="0" y="0"/>
+          <a:chExt cx="0" cy="0"/>
+        </a:xfrm>
+      </p:grpSpPr>
+      <p:sp>
+        <p:nvSpPr>
+          <p:cNvPr id="2" name="Title 1"/>
+          <p:cNvSpPr>
+            <a:spLocks noGrp="1"/>
+          </p:cNvSpPr>
+          <p:nvPr>
+            <p:ph type="title"/>
+          </p:nvPr>
+        </p:nvSpPr>
+        <p:spPr/>
+        <p:txBody>
+          <a:bodyPr/>
+          <a:lstStyle/>
+          <a:p>
+            <a:r>
+              <a:rPr lang="en-US" dirty="0" smtClean="0"/>
+              <a:t>Events</a:t>
+            </a:r>
+            <a:endParaRPr lang="en-US" dirty="0"/>
+          </a:p>
+        </p:txBody>
+      </p:sp>
+      <p:sp>
+        <p:nvSpPr>
+          <p:cNvPr id="3" name="Content Placeholder 2"/>
+          <p:cNvSpPr>
+            <a:spLocks noGrp="1"/>
+          </p:cNvSpPr>
+          <p:nvPr>
+            <p:ph idx="1"/>
+          </p:nvPr>
+        </p:nvSpPr>
+        <p:spPr/>
+        <p:txBody>
+          <a:bodyPr/>
+          <a:lstStyle/>
+          <a:p>
+            <a:r>
+              <a:rPr lang="en-US" dirty="0" smtClean="0"/>
+              <a:t>Pass references instead of string in </a:t>
+            </a:r>
+            <a:r>
+              <a:rPr lang="en-US" dirty="0" err="1" smtClean="0"/>
+              <a:t>attrebuite</a:t>
+            </a:r>
+            <a:endParaRPr lang="en-US" dirty="0" smtClean="0"/>
+          </a:p>
+          <a:p>
+            <a:r>
+              <a:rPr lang="en-US" dirty="0" err="1" smtClean="0"/>
+              <a:t>e.preventDefault</a:t>
+            </a:r>
+            <a:r>
+              <a:rPr lang="en-US" dirty="0" smtClean="0"/>
+              <a:t>();</a:t>
+            </a:r>
+          </a:p>
+          <a:p>
+            <a:r>
+              <a:rPr lang="en-US" dirty="0" smtClean="0"/>
+              <a:t>bind to this / arrow functions</a:t>
+            </a:r>
+          </a:p>
+          <a:p>
+            <a:r>
+              <a:rPr lang="en-US" dirty="0" smtClean="0"/>
+              <a:t>Passing arguments to event handler</a:t>
+            </a:r>
+          </a:p>
+          <a:p>
+            <a:pPr lvl="1"/>
+            <a:r>
+              <a:rPr lang="en-US" dirty="0"/>
+              <a:t>a</a:t>
+            </a:r>
+            <a:r>
+              <a:rPr lang="en-US" dirty="0" smtClean="0"/>
+              <a:t>rrow function</a:t>
+            </a:r>
+          </a:p>
+          <a:p>
+            <a:pPr lvl="1"/>
+            <a:r>
+              <a:rPr lang="en-US" dirty="0" smtClean="0"/>
+              <a:t>bind</a:t>
+            </a:r>
+          </a:p>
+          <a:p>
+            <a:endParaRPr lang="en-US" dirty="0" smtClean="0"/>
+          </a:p>
+          <a:p>
+            <a:pPr lvl="1"/>
+            <a:endParaRPr lang="en-US" dirty="0" smtClean="0"/>
+          </a:p>
+          <a:p>
+            <a:endParaRPr lang="en-US" dirty="0"/>
+          </a:p>
+        </p:txBody>
+      </p:sp>
+    </p:spTree>
+    <p:extLst>
+      <p:ext uri="{BB962C8B-B14F-4D97-AF65-F5344CB8AC3E}">
+        <p14:creationId xmlns:p14="http://schemas.microsoft.com/office/powerpoint/2010/main" val="2840278042"/>
+      </p:ext>
+    </p:extLst>
+  </p:cSld>
+  <p:clrMapOvr>
+    <a:masterClrMapping/>
+  </p:clrMapOvr>
+</p:sld>
+</file>
+
+<file path=ppt/slides/slide76.xml><?xml version="1.0" encoding="utf-8"?>
+<p:sld xmlns:a="http://schemas.openxmlformats.org/drawingml/2006/main" xmlns:r="http://schemas.openxmlformats.org/officeDocument/2006/relationships" xmlns:p="http://schemas.openxmlformats.org/presentationml/2006/main">
+  <p:cSld>
+    <p:spTree>
+      <p:nvGrpSpPr>
+        <p:cNvPr id="1" name=""/>
+        <p:cNvGrpSpPr/>
+        <p:nvPr/>
+      </p:nvGrpSpPr>
+      <p:grpSpPr>
+        <a:xfrm>
+          <a:off x="0" y="0"/>
+          <a:ext cx="0" cy="0"/>
+          <a:chOff x="0" y="0"/>
+          <a:chExt cx="0" cy="0"/>
+        </a:xfrm>
+      </p:grpSpPr>
+      <p:sp>
+        <p:nvSpPr>
+          <p:cNvPr id="2" name="Title 1"/>
+          <p:cNvSpPr>
+            <a:spLocks noGrp="1"/>
+          </p:cNvSpPr>
+          <p:nvPr>
+            <p:ph type="title"/>
+          </p:nvPr>
+        </p:nvSpPr>
+        <p:spPr/>
+        <p:txBody>
+          <a:bodyPr/>
+          <a:lstStyle/>
+          <a:p>
+            <a:r>
+              <a:rPr lang="en-US" dirty="0" smtClean="0"/>
               <a:t>Conditional Rendering</a:t>
             </a:r>
             <a:endParaRPr lang="en-US" dirty="0"/>
@@ -18823,18 +19123,6 @@
         <p:txBody>
           <a:bodyPr/>
           <a:lstStyle/>
-          <a:p>
-            <a:r>
-              <a:rPr lang="en-US" dirty="0" smtClean="0"/>
-              <a:t>Inline</a:t>
-            </a:r>
-          </a:p>
-          <a:p>
-            <a:r>
-              <a:rPr lang="en-US" dirty="0" smtClean="0"/>
-              <a:t>Prevent component from render</a:t>
-            </a:r>
-          </a:p>
           <a:p>
             <a:endParaRPr lang="en-US" dirty="0"/>
           </a:p>
@@ -18844,6 +19132,150 @@
     <p:extLst>
       <p:ext uri="{BB962C8B-B14F-4D97-AF65-F5344CB8AC3E}">
         <p14:creationId xmlns:p14="http://schemas.microsoft.com/office/powerpoint/2010/main" val="2873805691"/>
+      </p:ext>
+    </p:extLst>
+  </p:cSld>
+  <p:clrMapOvr>
+    <a:masterClrMapping/>
+  </p:clrMapOvr>
+</p:sld>
+</file>
+
+<file path=ppt/slides/slide77.xml><?xml version="1.0" encoding="utf-8"?>
+<p:sld xmlns:a="http://schemas.openxmlformats.org/drawingml/2006/main" xmlns:r="http://schemas.openxmlformats.org/officeDocument/2006/relationships" xmlns:p="http://schemas.openxmlformats.org/presentationml/2006/main">
+  <p:cSld>
+    <p:spTree>
+      <p:nvGrpSpPr>
+        <p:cNvPr id="1" name=""/>
+        <p:cNvGrpSpPr/>
+        <p:nvPr/>
+      </p:nvGrpSpPr>
+      <p:grpSpPr>
+        <a:xfrm>
+          <a:off x="0" y="0"/>
+          <a:ext cx="0" cy="0"/>
+          <a:chOff x="0" y="0"/>
+          <a:chExt cx="0" cy="0"/>
+        </a:xfrm>
+      </p:grpSpPr>
+      <p:sp>
+        <p:nvSpPr>
+          <p:cNvPr id="2" name="Title 1"/>
+          <p:cNvSpPr>
+            <a:spLocks noGrp="1"/>
+          </p:cNvSpPr>
+          <p:nvPr>
+            <p:ph type="title"/>
+          </p:nvPr>
+        </p:nvSpPr>
+        <p:spPr/>
+        <p:txBody>
+          <a:bodyPr/>
+          <a:lstStyle/>
+          <a:p>
+            <a:r>
+              <a:rPr lang="en-US" dirty="0" smtClean="0"/>
+              <a:t>Pure Component</a:t>
+            </a:r>
+            <a:endParaRPr lang="en-US" dirty="0"/>
+          </a:p>
+        </p:txBody>
+      </p:sp>
+      <p:sp>
+        <p:nvSpPr>
+          <p:cNvPr id="3" name="Content Placeholder 2"/>
+          <p:cNvSpPr>
+            <a:spLocks noGrp="1"/>
+          </p:cNvSpPr>
+          <p:nvPr>
+            <p:ph idx="1"/>
+          </p:nvPr>
+        </p:nvSpPr>
+        <p:spPr/>
+        <p:txBody>
+          <a:bodyPr/>
+          <a:lstStyle/>
+          <a:p>
+            <a:endParaRPr lang="en-US" dirty="0"/>
+          </a:p>
+        </p:txBody>
+      </p:sp>
+    </p:spTree>
+    <p:extLst>
+      <p:ext uri="{BB962C8B-B14F-4D97-AF65-F5344CB8AC3E}">
+        <p14:creationId xmlns:p14="http://schemas.microsoft.com/office/powerpoint/2010/main" val="2749338400"/>
+      </p:ext>
+    </p:extLst>
+  </p:cSld>
+  <p:clrMapOvr>
+    <a:masterClrMapping/>
+  </p:clrMapOvr>
+</p:sld>
+</file>
+
+<file path=ppt/slides/slide78.xml><?xml version="1.0" encoding="utf-8"?>
+<p:sld xmlns:a="http://schemas.openxmlformats.org/drawingml/2006/main" xmlns:r="http://schemas.openxmlformats.org/officeDocument/2006/relationships" xmlns:p="http://schemas.openxmlformats.org/presentationml/2006/main">
+  <p:cSld>
+    <p:spTree>
+      <p:nvGrpSpPr>
+        <p:cNvPr id="1" name=""/>
+        <p:cNvGrpSpPr/>
+        <p:nvPr/>
+      </p:nvGrpSpPr>
+      <p:grpSpPr>
+        <a:xfrm>
+          <a:off x="0" y="0"/>
+          <a:ext cx="0" cy="0"/>
+          <a:chOff x="0" y="0"/>
+          <a:chExt cx="0" cy="0"/>
+        </a:xfrm>
+      </p:grpSpPr>
+      <p:sp>
+        <p:nvSpPr>
+          <p:cNvPr id="2" name="Title 1"/>
+          <p:cNvSpPr>
+            <a:spLocks noGrp="1"/>
+          </p:cNvSpPr>
+          <p:nvPr>
+            <p:ph type="title"/>
+          </p:nvPr>
+        </p:nvSpPr>
+        <p:spPr/>
+        <p:txBody>
+          <a:bodyPr/>
+          <a:lstStyle/>
+          <a:p>
+            <a:r>
+              <a:rPr lang="en-US" dirty="0" err="1" smtClean="0"/>
+              <a:t>axios</a:t>
+            </a:r>
+            <a:endParaRPr lang="en-US" dirty="0"/>
+          </a:p>
+        </p:txBody>
+      </p:sp>
+      <p:sp>
+        <p:nvSpPr>
+          <p:cNvPr id="3" name="Content Placeholder 2"/>
+          <p:cNvSpPr>
+            <a:spLocks noGrp="1"/>
+          </p:cNvSpPr>
+          <p:nvPr>
+            <p:ph idx="1"/>
+          </p:nvPr>
+        </p:nvSpPr>
+        <p:spPr/>
+        <p:txBody>
+          <a:bodyPr/>
+          <a:lstStyle/>
+          <a:p>
+            <a:endParaRPr lang="en-US" dirty="0"/>
+          </a:p>
+        </p:txBody>
+      </p:sp>
+    </p:spTree>
+    <p:extLst>
+      <p:ext uri="{BB962C8B-B14F-4D97-AF65-F5344CB8AC3E}">
+        <p14:creationId xmlns:p14="http://schemas.microsoft.com/office/powerpoint/2010/main" val="3784658374"/>
       </p:ext>
     </p:extLst>
   </p:cSld>

</xml_diff>